<commit_message>
slide deck without the first page
</commit_message>
<xml_diff>
--- a/Slide Deck.pptx
+++ b/Slide Deck.pptx
@@ -111,6 +111,11 @@
       </a:defRPr>
     </a:lvl9pPr>
   </p:defaultTextStyle>
+  <p:extLst>
+    <p:ext uri="{EFAFB233-063F-42B5-8137-9DF3F51BA10A}">
+      <p15:sldGuideLst xmlns:p15="http://schemas.microsoft.com/office/powerpoint/2012/main"/>
+    </p:ext>
+  </p:extLst>
 </p:presentation>
 </file>
 
@@ -261,7 +266,7 @@
           <a:p>
             <a:fld id="{D55E346E-C58B-4EB8-9FAF-2850C663A5EC}" type="datetimeFigureOut">
               <a:rPr lang="en-US" smtClean="0"/>
-              <a:t>10/21/2023</a:t>
+              <a:t>10/22/2023</a:t>
             </a:fld>
             <a:endParaRPr lang="en-US"/>
           </a:p>
@@ -459,7 +464,7 @@
           <a:p>
             <a:fld id="{D55E346E-C58B-4EB8-9FAF-2850C663A5EC}" type="datetimeFigureOut">
               <a:rPr lang="en-US" smtClean="0"/>
-              <a:t>10/21/2023</a:t>
+              <a:t>10/22/2023</a:t>
             </a:fld>
             <a:endParaRPr lang="en-US"/>
           </a:p>
@@ -667,7 +672,7 @@
           <a:p>
             <a:fld id="{D55E346E-C58B-4EB8-9FAF-2850C663A5EC}" type="datetimeFigureOut">
               <a:rPr lang="en-US" smtClean="0"/>
-              <a:t>10/21/2023</a:t>
+              <a:t>10/22/2023</a:t>
             </a:fld>
             <a:endParaRPr lang="en-US"/>
           </a:p>
@@ -865,7 +870,7 @@
           <a:p>
             <a:fld id="{D55E346E-C58B-4EB8-9FAF-2850C663A5EC}" type="datetimeFigureOut">
               <a:rPr lang="en-US" smtClean="0"/>
-              <a:t>10/21/2023</a:t>
+              <a:t>10/22/2023</a:t>
             </a:fld>
             <a:endParaRPr lang="en-US"/>
           </a:p>
@@ -1140,7 +1145,7 @@
           <a:p>
             <a:fld id="{D55E346E-C58B-4EB8-9FAF-2850C663A5EC}" type="datetimeFigureOut">
               <a:rPr lang="en-US" smtClean="0"/>
-              <a:t>10/21/2023</a:t>
+              <a:t>10/22/2023</a:t>
             </a:fld>
             <a:endParaRPr lang="en-US"/>
           </a:p>
@@ -1405,7 +1410,7 @@
           <a:p>
             <a:fld id="{D55E346E-C58B-4EB8-9FAF-2850C663A5EC}" type="datetimeFigureOut">
               <a:rPr lang="en-US" smtClean="0"/>
-              <a:t>10/21/2023</a:t>
+              <a:t>10/22/2023</a:t>
             </a:fld>
             <a:endParaRPr lang="en-US"/>
           </a:p>
@@ -1817,7 +1822,7 @@
           <a:p>
             <a:fld id="{D55E346E-C58B-4EB8-9FAF-2850C663A5EC}" type="datetimeFigureOut">
               <a:rPr lang="en-US" smtClean="0"/>
-              <a:t>10/21/2023</a:t>
+              <a:t>10/22/2023</a:t>
             </a:fld>
             <a:endParaRPr lang="en-US"/>
           </a:p>
@@ -1958,7 +1963,7 @@
           <a:p>
             <a:fld id="{D55E346E-C58B-4EB8-9FAF-2850C663A5EC}" type="datetimeFigureOut">
               <a:rPr lang="en-US" smtClean="0"/>
-              <a:t>10/21/2023</a:t>
+              <a:t>10/22/2023</a:t>
             </a:fld>
             <a:endParaRPr lang="en-US"/>
           </a:p>
@@ -2071,7 +2076,7 @@
           <a:p>
             <a:fld id="{D55E346E-C58B-4EB8-9FAF-2850C663A5EC}" type="datetimeFigureOut">
               <a:rPr lang="en-US" smtClean="0"/>
-              <a:t>10/21/2023</a:t>
+              <a:t>10/22/2023</a:t>
             </a:fld>
             <a:endParaRPr lang="en-US"/>
           </a:p>
@@ -2382,7 +2387,7 @@
           <a:p>
             <a:fld id="{D55E346E-C58B-4EB8-9FAF-2850C663A5EC}" type="datetimeFigureOut">
               <a:rPr lang="en-US" smtClean="0"/>
-              <a:t>10/21/2023</a:t>
+              <a:t>10/22/2023</a:t>
             </a:fld>
             <a:endParaRPr lang="en-US"/>
           </a:p>
@@ -2670,7 +2675,7 @@
           <a:p>
             <a:fld id="{D55E346E-C58B-4EB8-9FAF-2850C663A5EC}" type="datetimeFigureOut">
               <a:rPr lang="en-US" smtClean="0"/>
-              <a:t>10/21/2023</a:t>
+              <a:t>10/22/2023</a:t>
             </a:fld>
             <a:endParaRPr lang="en-US"/>
           </a:p>
@@ -2911,7 +2916,7 @@
           <a:p>
             <a:fld id="{D55E346E-C58B-4EB8-9FAF-2850C663A5EC}" type="datetimeFigureOut">
               <a:rPr lang="en-US" smtClean="0"/>
-              <a:t>10/21/2023</a:t>
+              <a:t>10/22/2023</a:t>
             </a:fld>
             <a:endParaRPr lang="en-US"/>
           </a:p>
@@ -3356,28 +3361,7 @@
             </a:br>
             <a:r>
               <a:rPr lang="en-US" sz="2800" dirty="0"/>
-              <a:t>    Problem identification (1-2 slides)</a:t>
-            </a:r>
-            <a:br>
-              <a:rPr lang="en-US" sz="2800" dirty="0"/>
-            </a:br>
-            <a:r>
-              <a:rPr lang="en-US" sz="2800" dirty="0"/>
-              <a:t>    Recommendation and key findings (1 slide)</a:t>
-            </a:r>
-            <a:br>
-              <a:rPr lang="en-US" sz="2800" dirty="0"/>
-            </a:br>
-            <a:r>
-              <a:rPr lang="en-US" sz="2800" dirty="0"/>
-              <a:t>    Modeling results and analysis (3-4 slides)</a:t>
-            </a:r>
-            <a:br>
-              <a:rPr lang="en-US" sz="2800" dirty="0"/>
-            </a:br>
-            <a:r>
-              <a:rPr lang="en-US" sz="2800" dirty="0"/>
-              <a:t>    Summary and conclusion (1 slide) </a:t>
+              <a:t>Big Mountain Resort Report</a:t>
             </a:r>
             <a:br>
               <a:rPr lang="en-US" sz="2800" dirty="0"/>
@@ -3407,7 +3391,10 @@
           <a:bodyPr/>
           <a:lstStyle/>
           <a:p>
-            <a:endParaRPr lang="en-US" dirty="0"/>
+            <a:r>
+              <a:rPr lang="en-US" dirty="0"/>
+              <a:t>John Wu</a:t>
+            </a:r>
           </a:p>
         </p:txBody>
       </p:sp>

</xml_diff>